<commit_message>
Update : Week3 PPT, PDF
PPT, PDF 분석절차 수정
</commit_message>
<xml_diff>
--- a/Week3/Week3 - 기초통계(2).pptx
+++ b/Week3/Week3 - 기초통계(2).pptx
@@ -4,6 +4,9 @@
   <p:sldMasterIdLst>
     <p:sldMasterId id="2147483648" r:id="rId1"/>
   </p:sldMasterIdLst>
+  <p:notesMasterIdLst>
+    <p:notesMasterId r:id="rId29"/>
+  </p:notesMasterIdLst>
   <p:sldIdLst>
     <p:sldId id="256" r:id="rId2"/>
     <p:sldId id="261" r:id="rId3"/>
@@ -30,6 +33,8 @@
     <p:sldId id="279" r:id="rId24"/>
     <p:sldId id="280" r:id="rId25"/>
     <p:sldId id="281" r:id="rId26"/>
+    <p:sldId id="287" r:id="rId27"/>
+    <p:sldId id="288" r:id="rId28"/>
   </p:sldIdLst>
   <p:sldSz cx="12192000" cy="6858000"/>
   <p:notesSz cx="6858000" cy="9144000"/>
@@ -136,6 +141,440 @@
 </p:presentation>
 </file>
 
+<file path=ppt/notesMasters/notesMaster1.xml><?xml version="1.0" encoding="utf-8"?>
+<p:notesMaster xmlns:a="http://schemas.openxmlformats.org/drawingml/2006/main" xmlns:r="http://schemas.openxmlformats.org/officeDocument/2006/relationships" xmlns:p="http://schemas.openxmlformats.org/presentationml/2006/main">
+  <p:cSld>
+    <p:bg>
+      <p:bgRef idx="1001">
+        <a:schemeClr val="bg1"/>
+      </p:bgRef>
+    </p:bg>
+    <p:spTree>
+      <p:nvGrpSpPr>
+        <p:cNvPr id="1" name=""/>
+        <p:cNvGrpSpPr/>
+        <p:nvPr/>
+      </p:nvGrpSpPr>
+      <p:grpSpPr>
+        <a:xfrm>
+          <a:off x="0" y="0"/>
+          <a:ext cx="0" cy="0"/>
+          <a:chOff x="0" y="0"/>
+          <a:chExt cx="0" cy="0"/>
+        </a:xfrm>
+      </p:grpSpPr>
+      <p:sp>
+        <p:nvSpPr>
+          <p:cNvPr id="2" name="머리글 개체 틀 1"/>
+          <p:cNvSpPr>
+            <a:spLocks noGrp="1"/>
+          </p:cNvSpPr>
+          <p:nvPr>
+            <p:ph type="hdr" sz="quarter"/>
+          </p:nvPr>
+        </p:nvSpPr>
+        <p:spPr>
+          <a:xfrm>
+            <a:off x="0" y="0"/>
+            <a:ext cx="2971800" cy="458788"/>
+          </a:xfrm>
+          <a:prstGeom prst="rect">
+            <a:avLst/>
+          </a:prstGeom>
+        </p:spPr>
+        <p:txBody>
+          <a:bodyPr vert="horz" lIns="91440" tIns="45720" rIns="91440" bIns="45720" rtlCol="0"/>
+          <a:lstStyle>
+            <a:lvl1pPr algn="l">
+              <a:defRPr sz="1200"/>
+            </a:lvl1pPr>
+          </a:lstStyle>
+          <a:p>
+            <a:endParaRPr kumimoji="1" lang="ko-Kore-KR" altLang="en-US"/>
+          </a:p>
+        </p:txBody>
+      </p:sp>
+      <p:sp>
+        <p:nvSpPr>
+          <p:cNvPr id="3" name="날짜 개체 틀 2"/>
+          <p:cNvSpPr>
+            <a:spLocks noGrp="1"/>
+          </p:cNvSpPr>
+          <p:nvPr>
+            <p:ph type="dt" idx="1"/>
+          </p:nvPr>
+        </p:nvSpPr>
+        <p:spPr>
+          <a:xfrm>
+            <a:off x="3884613" y="0"/>
+            <a:ext cx="2971800" cy="458788"/>
+          </a:xfrm>
+          <a:prstGeom prst="rect">
+            <a:avLst/>
+          </a:prstGeom>
+        </p:spPr>
+        <p:txBody>
+          <a:bodyPr vert="horz" lIns="91440" tIns="45720" rIns="91440" bIns="45720" rtlCol="0"/>
+          <a:lstStyle>
+            <a:lvl1pPr algn="r">
+              <a:defRPr sz="1200"/>
+            </a:lvl1pPr>
+          </a:lstStyle>
+          <a:p>
+            <a:fld id="{80CAF9E7-19CE-A648-B477-C4AFE820E1F9}" type="datetimeFigureOut">
+              <a:rPr kumimoji="1" lang="ko-Kore-KR" altLang="en-US" smtClean="0"/>
+              <a:t>2022. 6. 13.</a:t>
+            </a:fld>
+            <a:endParaRPr kumimoji="1" lang="ko-Kore-KR" altLang="en-US"/>
+          </a:p>
+        </p:txBody>
+      </p:sp>
+      <p:sp>
+        <p:nvSpPr>
+          <p:cNvPr id="4" name="슬라이드 이미지 개체 틀 3"/>
+          <p:cNvSpPr>
+            <a:spLocks noGrp="1" noRot="1" noChangeAspect="1"/>
+          </p:cNvSpPr>
+          <p:nvPr>
+            <p:ph type="sldImg" idx="2"/>
+          </p:nvPr>
+        </p:nvSpPr>
+        <p:spPr>
+          <a:xfrm>
+            <a:off x="685800" y="1143000"/>
+            <a:ext cx="5486400" cy="3086100"/>
+          </a:xfrm>
+          <a:prstGeom prst="rect">
+            <a:avLst/>
+          </a:prstGeom>
+          <a:noFill/>
+          <a:ln w="12700">
+            <a:solidFill>
+              <a:prstClr val="black"/>
+            </a:solidFill>
+          </a:ln>
+        </p:spPr>
+        <p:txBody>
+          <a:bodyPr vert="horz" lIns="91440" tIns="45720" rIns="91440" bIns="45720" rtlCol="0" anchor="ctr"/>
+          <a:lstStyle/>
+          <a:p>
+            <a:endParaRPr lang="ko-Kore-KR" altLang="en-US"/>
+          </a:p>
+        </p:txBody>
+      </p:sp>
+      <p:sp>
+        <p:nvSpPr>
+          <p:cNvPr id="5" name="슬라이드 노트 개체 틀 4"/>
+          <p:cNvSpPr>
+            <a:spLocks noGrp="1"/>
+          </p:cNvSpPr>
+          <p:nvPr>
+            <p:ph type="body" sz="quarter" idx="3"/>
+          </p:nvPr>
+        </p:nvSpPr>
+        <p:spPr>
+          <a:xfrm>
+            <a:off x="685800" y="4400550"/>
+            <a:ext cx="5486400" cy="3600450"/>
+          </a:xfrm>
+          <a:prstGeom prst="rect">
+            <a:avLst/>
+          </a:prstGeom>
+        </p:spPr>
+        <p:txBody>
+          <a:bodyPr vert="horz" lIns="91440" tIns="45720" rIns="91440" bIns="45720" rtlCol="0"/>
+          <a:lstStyle/>
+          <a:p>
+            <a:pPr lvl="0"/>
+            <a:r>
+              <a:rPr kumimoji="1" lang="ko-KR" altLang="en-US"/>
+              <a:t>마스터 텍스트 스타일을 편집하려면 클릭</a:t>
+            </a:r>
+          </a:p>
+          <a:p>
+            <a:pPr lvl="1"/>
+            <a:r>
+              <a:rPr kumimoji="1" lang="ko-KR" altLang="en-US"/>
+              <a:t>두 번째 수준</a:t>
+            </a:r>
+          </a:p>
+          <a:p>
+            <a:pPr lvl="2"/>
+            <a:r>
+              <a:rPr kumimoji="1" lang="ko-KR" altLang="en-US"/>
+              <a:t>세 번째 수준</a:t>
+            </a:r>
+          </a:p>
+          <a:p>
+            <a:pPr lvl="3"/>
+            <a:r>
+              <a:rPr kumimoji="1" lang="ko-KR" altLang="en-US"/>
+              <a:t>네 번째 수준</a:t>
+            </a:r>
+          </a:p>
+          <a:p>
+            <a:pPr lvl="4"/>
+            <a:r>
+              <a:rPr kumimoji="1" lang="ko-KR" altLang="en-US"/>
+              <a:t>다섯 번째 수준</a:t>
+            </a:r>
+            <a:endParaRPr kumimoji="1" lang="ko-Kore-KR" altLang="en-US"/>
+          </a:p>
+        </p:txBody>
+      </p:sp>
+      <p:sp>
+        <p:nvSpPr>
+          <p:cNvPr id="6" name="바닥글 개체 틀 5"/>
+          <p:cNvSpPr>
+            <a:spLocks noGrp="1"/>
+          </p:cNvSpPr>
+          <p:nvPr>
+            <p:ph type="ftr" sz="quarter" idx="4"/>
+          </p:nvPr>
+        </p:nvSpPr>
+        <p:spPr>
+          <a:xfrm>
+            <a:off x="0" y="8685213"/>
+            <a:ext cx="2971800" cy="458787"/>
+          </a:xfrm>
+          <a:prstGeom prst="rect">
+            <a:avLst/>
+          </a:prstGeom>
+        </p:spPr>
+        <p:txBody>
+          <a:bodyPr vert="horz" lIns="91440" tIns="45720" rIns="91440" bIns="45720" rtlCol="0" anchor="b"/>
+          <a:lstStyle>
+            <a:lvl1pPr algn="l">
+              <a:defRPr sz="1200"/>
+            </a:lvl1pPr>
+          </a:lstStyle>
+          <a:p>
+            <a:endParaRPr kumimoji="1" lang="ko-Kore-KR" altLang="en-US"/>
+          </a:p>
+        </p:txBody>
+      </p:sp>
+      <p:sp>
+        <p:nvSpPr>
+          <p:cNvPr id="7" name="슬라이드 번호 개체 틀 6"/>
+          <p:cNvSpPr>
+            <a:spLocks noGrp="1"/>
+          </p:cNvSpPr>
+          <p:nvPr>
+            <p:ph type="sldNum" sz="quarter" idx="5"/>
+          </p:nvPr>
+        </p:nvSpPr>
+        <p:spPr>
+          <a:xfrm>
+            <a:off x="3884613" y="8685213"/>
+            <a:ext cx="2971800" cy="458787"/>
+          </a:xfrm>
+          <a:prstGeom prst="rect">
+            <a:avLst/>
+          </a:prstGeom>
+        </p:spPr>
+        <p:txBody>
+          <a:bodyPr vert="horz" lIns="91440" tIns="45720" rIns="91440" bIns="45720" rtlCol="0" anchor="b"/>
+          <a:lstStyle>
+            <a:lvl1pPr algn="r">
+              <a:defRPr sz="1200"/>
+            </a:lvl1pPr>
+          </a:lstStyle>
+          <a:p>
+            <a:fld id="{A2E7C0ED-8847-514B-8AEA-42FABF661868}" type="slidenum">
+              <a:rPr kumimoji="1" lang="ko-Kore-KR" altLang="en-US" smtClean="0"/>
+              <a:t>‹#›</a:t>
+            </a:fld>
+            <a:endParaRPr kumimoji="1" lang="ko-Kore-KR" altLang="en-US"/>
+          </a:p>
+        </p:txBody>
+      </p:sp>
+    </p:spTree>
+    <p:extLst>
+      <p:ext uri="{BB962C8B-B14F-4D97-AF65-F5344CB8AC3E}">
+        <p14:creationId xmlns:p14="http://schemas.microsoft.com/office/powerpoint/2010/main" val="2618112479"/>
+      </p:ext>
+    </p:extLst>
+  </p:cSld>
+  <p:clrMap bg1="lt1" tx1="dk1" bg2="lt2" tx2="dk2" accent1="accent1" accent2="accent2" accent3="accent3" accent4="accent4" accent5="accent5" accent6="accent6" hlink="hlink" folHlink="folHlink"/>
+  <p:notesStyle>
+    <a:lvl1pPr marL="0" algn="l" defTabSz="914400" rtl="0" eaLnBrk="1" latinLnBrk="0" hangingPunct="1">
+      <a:defRPr sz="1200" kern="1200">
+        <a:solidFill>
+          <a:schemeClr val="tx1"/>
+        </a:solidFill>
+        <a:latin typeface="+mn-lt"/>
+        <a:ea typeface="+mn-ea"/>
+        <a:cs typeface="+mn-cs"/>
+      </a:defRPr>
+    </a:lvl1pPr>
+    <a:lvl2pPr marL="457200" algn="l" defTabSz="914400" rtl="0" eaLnBrk="1" latinLnBrk="0" hangingPunct="1">
+      <a:defRPr sz="1200" kern="1200">
+        <a:solidFill>
+          <a:schemeClr val="tx1"/>
+        </a:solidFill>
+        <a:latin typeface="+mn-lt"/>
+        <a:ea typeface="+mn-ea"/>
+        <a:cs typeface="+mn-cs"/>
+      </a:defRPr>
+    </a:lvl2pPr>
+    <a:lvl3pPr marL="914400" algn="l" defTabSz="914400" rtl="0" eaLnBrk="1" latinLnBrk="0" hangingPunct="1">
+      <a:defRPr sz="1200" kern="1200">
+        <a:solidFill>
+          <a:schemeClr val="tx1"/>
+        </a:solidFill>
+        <a:latin typeface="+mn-lt"/>
+        <a:ea typeface="+mn-ea"/>
+        <a:cs typeface="+mn-cs"/>
+      </a:defRPr>
+    </a:lvl3pPr>
+    <a:lvl4pPr marL="1371600" algn="l" defTabSz="914400" rtl="0" eaLnBrk="1" latinLnBrk="0" hangingPunct="1">
+      <a:defRPr sz="1200" kern="1200">
+        <a:solidFill>
+          <a:schemeClr val="tx1"/>
+        </a:solidFill>
+        <a:latin typeface="+mn-lt"/>
+        <a:ea typeface="+mn-ea"/>
+        <a:cs typeface="+mn-cs"/>
+      </a:defRPr>
+    </a:lvl4pPr>
+    <a:lvl5pPr marL="1828800" algn="l" defTabSz="914400" rtl="0" eaLnBrk="1" latinLnBrk="0" hangingPunct="1">
+      <a:defRPr sz="1200" kern="1200">
+        <a:solidFill>
+          <a:schemeClr val="tx1"/>
+        </a:solidFill>
+        <a:latin typeface="+mn-lt"/>
+        <a:ea typeface="+mn-ea"/>
+        <a:cs typeface="+mn-cs"/>
+      </a:defRPr>
+    </a:lvl5pPr>
+    <a:lvl6pPr marL="2286000" algn="l" defTabSz="914400" rtl="0" eaLnBrk="1" latinLnBrk="0" hangingPunct="1">
+      <a:defRPr sz="1200" kern="1200">
+        <a:solidFill>
+          <a:schemeClr val="tx1"/>
+        </a:solidFill>
+        <a:latin typeface="+mn-lt"/>
+        <a:ea typeface="+mn-ea"/>
+        <a:cs typeface="+mn-cs"/>
+      </a:defRPr>
+    </a:lvl6pPr>
+    <a:lvl7pPr marL="2743200" algn="l" defTabSz="914400" rtl="0" eaLnBrk="1" latinLnBrk="0" hangingPunct="1">
+      <a:defRPr sz="1200" kern="1200">
+        <a:solidFill>
+          <a:schemeClr val="tx1"/>
+        </a:solidFill>
+        <a:latin typeface="+mn-lt"/>
+        <a:ea typeface="+mn-ea"/>
+        <a:cs typeface="+mn-cs"/>
+      </a:defRPr>
+    </a:lvl7pPr>
+    <a:lvl8pPr marL="3200400" algn="l" defTabSz="914400" rtl="0" eaLnBrk="1" latinLnBrk="0" hangingPunct="1">
+      <a:defRPr sz="1200" kern="1200">
+        <a:solidFill>
+          <a:schemeClr val="tx1"/>
+        </a:solidFill>
+        <a:latin typeface="+mn-lt"/>
+        <a:ea typeface="+mn-ea"/>
+        <a:cs typeface="+mn-cs"/>
+      </a:defRPr>
+    </a:lvl8pPr>
+    <a:lvl9pPr marL="3657600" algn="l" defTabSz="914400" rtl="0" eaLnBrk="1" latinLnBrk="0" hangingPunct="1">
+      <a:defRPr sz="1200" kern="1200">
+        <a:solidFill>
+          <a:schemeClr val="tx1"/>
+        </a:solidFill>
+        <a:latin typeface="+mn-lt"/>
+        <a:ea typeface="+mn-ea"/>
+        <a:cs typeface="+mn-cs"/>
+      </a:defRPr>
+    </a:lvl9pPr>
+  </p:notesStyle>
+</p:notesMaster>
+</file>
+
+<file path=ppt/notesSlides/notesSlide1.xml><?xml version="1.0" encoding="utf-8"?>
+<p:notes xmlns:a="http://schemas.openxmlformats.org/drawingml/2006/main" xmlns:r="http://schemas.openxmlformats.org/officeDocument/2006/relationships" xmlns:p="http://schemas.openxmlformats.org/presentationml/2006/main">
+  <p:cSld>
+    <p:spTree>
+      <p:nvGrpSpPr>
+        <p:cNvPr id="1" name=""/>
+        <p:cNvGrpSpPr/>
+        <p:nvPr/>
+      </p:nvGrpSpPr>
+      <p:grpSpPr>
+        <a:xfrm>
+          <a:off x="0" y="0"/>
+          <a:ext cx="0" cy="0"/>
+          <a:chOff x="0" y="0"/>
+          <a:chExt cx="0" cy="0"/>
+        </a:xfrm>
+      </p:grpSpPr>
+      <p:sp>
+        <p:nvSpPr>
+          <p:cNvPr id="2" name="슬라이드 이미지 개체 틀 1"/>
+          <p:cNvSpPr>
+            <a:spLocks noGrp="1" noRot="1" noChangeAspect="1"/>
+          </p:cNvSpPr>
+          <p:nvPr>
+            <p:ph type="sldImg"/>
+          </p:nvPr>
+        </p:nvSpPr>
+        <p:spPr/>
+      </p:sp>
+      <p:sp>
+        <p:nvSpPr>
+          <p:cNvPr id="3" name="슬라이드 노트 개체 틀 2"/>
+          <p:cNvSpPr>
+            <a:spLocks noGrp="1"/>
+          </p:cNvSpPr>
+          <p:nvPr>
+            <p:ph type="body" idx="1"/>
+          </p:nvPr>
+        </p:nvSpPr>
+        <p:spPr/>
+        <p:txBody>
+          <a:bodyPr/>
+          <a:lstStyle/>
+          <a:p>
+            <a:endParaRPr kumimoji="1" lang="ko-Kore-KR" altLang="en-US" dirty="0"/>
+          </a:p>
+        </p:txBody>
+      </p:sp>
+      <p:sp>
+        <p:nvSpPr>
+          <p:cNvPr id="4" name="슬라이드 번호 개체 틀 3"/>
+          <p:cNvSpPr>
+            <a:spLocks noGrp="1"/>
+          </p:cNvSpPr>
+          <p:nvPr>
+            <p:ph type="sldNum" sz="quarter" idx="5"/>
+          </p:nvPr>
+        </p:nvSpPr>
+        <p:spPr/>
+        <p:txBody>
+          <a:bodyPr/>
+          <a:lstStyle/>
+          <a:p>
+            <a:fld id="{A2E7C0ED-8847-514B-8AEA-42FABF661868}" type="slidenum">
+              <a:rPr kumimoji="1" lang="ko-Kore-KR" altLang="en-US" smtClean="0"/>
+              <a:t>26</a:t>
+            </a:fld>
+            <a:endParaRPr kumimoji="1" lang="ko-Kore-KR" altLang="en-US"/>
+          </a:p>
+        </p:txBody>
+      </p:sp>
+    </p:spTree>
+    <p:extLst>
+      <p:ext uri="{BB962C8B-B14F-4D97-AF65-F5344CB8AC3E}">
+        <p14:creationId xmlns:p14="http://schemas.microsoft.com/office/powerpoint/2010/main" val="1151365186"/>
+      </p:ext>
+    </p:extLst>
+  </p:cSld>
+  <p:clrMapOvr>
+    <a:masterClrMapping/>
+  </p:clrMapOvr>
+</p:notes>
+</file>
+
 <file path=ppt/slideLayouts/slideLayout1.xml><?xml version="1.0" encoding="utf-8"?>
 <p:sldLayout xmlns:a="http://schemas.openxmlformats.org/drawingml/2006/main" xmlns:r="http://schemas.openxmlformats.org/officeDocument/2006/relationships" xmlns:p="http://schemas.openxmlformats.org/presentationml/2006/main" type="title" preserve="1">
   <p:cSld name="제목 슬라이드">
@@ -285,7 +724,7 @@
           <a:p>
             <a:fld id="{D7A638E7-8D61-EB43-B344-131D88868B82}" type="datetimeFigureOut">
               <a:rPr kumimoji="1" lang="ko-Kore-KR" altLang="en-US" smtClean="0"/>
-              <a:t>2022. 6. 3.</a:t>
+              <a:t>2022. 6. 13.</a:t>
             </a:fld>
             <a:endParaRPr kumimoji="1" lang="ko-Kore-KR" altLang="en-US"/>
           </a:p>
@@ -485,7 +924,7 @@
           <a:p>
             <a:fld id="{D7A638E7-8D61-EB43-B344-131D88868B82}" type="datetimeFigureOut">
               <a:rPr kumimoji="1" lang="ko-Kore-KR" altLang="en-US" smtClean="0"/>
-              <a:t>2022. 6. 3.</a:t>
+              <a:t>2022. 6. 13.</a:t>
             </a:fld>
             <a:endParaRPr kumimoji="1" lang="ko-Kore-KR" altLang="en-US"/>
           </a:p>
@@ -695,7 +1134,7 @@
           <a:p>
             <a:fld id="{D7A638E7-8D61-EB43-B344-131D88868B82}" type="datetimeFigureOut">
               <a:rPr kumimoji="1" lang="ko-Kore-KR" altLang="en-US" smtClean="0"/>
-              <a:t>2022. 6. 3.</a:t>
+              <a:t>2022. 6. 13.</a:t>
             </a:fld>
             <a:endParaRPr kumimoji="1" lang="ko-Kore-KR" altLang="en-US"/>
           </a:p>
@@ -895,7 +1334,7 @@
           <a:p>
             <a:fld id="{D7A638E7-8D61-EB43-B344-131D88868B82}" type="datetimeFigureOut">
               <a:rPr kumimoji="1" lang="ko-Kore-KR" altLang="en-US" smtClean="0"/>
-              <a:t>2022. 6. 3.</a:t>
+              <a:t>2022. 6. 13.</a:t>
             </a:fld>
             <a:endParaRPr kumimoji="1" lang="ko-Kore-KR" altLang="en-US"/>
           </a:p>
@@ -1171,7 +1610,7 @@
           <a:p>
             <a:fld id="{D7A638E7-8D61-EB43-B344-131D88868B82}" type="datetimeFigureOut">
               <a:rPr kumimoji="1" lang="ko-Kore-KR" altLang="en-US" smtClean="0"/>
-              <a:t>2022. 6. 3.</a:t>
+              <a:t>2022. 6. 13.</a:t>
             </a:fld>
             <a:endParaRPr kumimoji="1" lang="ko-Kore-KR" altLang="en-US"/>
           </a:p>
@@ -1439,7 +1878,7 @@
           <a:p>
             <a:fld id="{D7A638E7-8D61-EB43-B344-131D88868B82}" type="datetimeFigureOut">
               <a:rPr kumimoji="1" lang="ko-Kore-KR" altLang="en-US" smtClean="0"/>
-              <a:t>2022. 6. 3.</a:t>
+              <a:t>2022. 6. 13.</a:t>
             </a:fld>
             <a:endParaRPr kumimoji="1" lang="ko-Kore-KR" altLang="en-US"/>
           </a:p>
@@ -1854,7 +2293,7 @@
           <a:p>
             <a:fld id="{D7A638E7-8D61-EB43-B344-131D88868B82}" type="datetimeFigureOut">
               <a:rPr kumimoji="1" lang="ko-Kore-KR" altLang="en-US" smtClean="0"/>
-              <a:t>2022. 6. 3.</a:t>
+              <a:t>2022. 6. 13.</a:t>
             </a:fld>
             <a:endParaRPr kumimoji="1" lang="ko-Kore-KR" altLang="en-US"/>
           </a:p>
@@ -1996,7 +2435,7 @@
           <a:p>
             <a:fld id="{D7A638E7-8D61-EB43-B344-131D88868B82}" type="datetimeFigureOut">
               <a:rPr kumimoji="1" lang="ko-Kore-KR" altLang="en-US" smtClean="0"/>
-              <a:t>2022. 6. 3.</a:t>
+              <a:t>2022. 6. 13.</a:t>
             </a:fld>
             <a:endParaRPr kumimoji="1" lang="ko-Kore-KR" altLang="en-US"/>
           </a:p>
@@ -2109,7 +2548,7 @@
           <a:p>
             <a:fld id="{D7A638E7-8D61-EB43-B344-131D88868B82}" type="datetimeFigureOut">
               <a:rPr kumimoji="1" lang="ko-Kore-KR" altLang="en-US" smtClean="0"/>
-              <a:t>2022. 6. 3.</a:t>
+              <a:t>2022. 6. 13.</a:t>
             </a:fld>
             <a:endParaRPr kumimoji="1" lang="ko-Kore-KR" altLang="en-US"/>
           </a:p>
@@ -2422,7 +2861,7 @@
           <a:p>
             <a:fld id="{D7A638E7-8D61-EB43-B344-131D88868B82}" type="datetimeFigureOut">
               <a:rPr kumimoji="1" lang="ko-Kore-KR" altLang="en-US" smtClean="0"/>
-              <a:t>2022. 6. 3.</a:t>
+              <a:t>2022. 6. 13.</a:t>
             </a:fld>
             <a:endParaRPr kumimoji="1" lang="ko-Kore-KR" altLang="en-US"/>
           </a:p>
@@ -2711,7 +3150,7 @@
           <a:p>
             <a:fld id="{D7A638E7-8D61-EB43-B344-131D88868B82}" type="datetimeFigureOut">
               <a:rPr kumimoji="1" lang="ko-Kore-KR" altLang="en-US" smtClean="0"/>
-              <a:t>2022. 6. 3.</a:t>
+              <a:t>2022. 6. 13.</a:t>
             </a:fld>
             <a:endParaRPr kumimoji="1" lang="ko-Kore-KR" altLang="en-US"/>
           </a:p>
@@ -2957,7 +3396,7 @@
           <a:p>
             <a:fld id="{D7A638E7-8D61-EB43-B344-131D88868B82}" type="datetimeFigureOut">
               <a:rPr kumimoji="1" lang="ko-Kore-KR" altLang="en-US" smtClean="0"/>
-              <a:t>2022. 6. 3.</a:t>
+              <a:t>2022. 6. 13.</a:t>
             </a:fld>
             <a:endParaRPr kumimoji="1" lang="ko-Kore-KR" altLang="en-US"/>
           </a:p>
@@ -6151,8 +6590,8 @@
           </a:p>
         </p:txBody>
       </p:sp>
-      <mc:AlternateContent xmlns:mc="http://schemas.openxmlformats.org/markup-compatibility/2006">
-        <mc:Choice xmlns:a14="http://schemas.microsoft.com/office/drawing/2010/main" Requires="a14">
+      <mc:AlternateContent xmlns:mc="http://schemas.openxmlformats.org/markup-compatibility/2006" xmlns:a14="http://schemas.microsoft.com/office/drawing/2010/main">
+        <mc:Choice Requires="a14">
           <p:sp>
             <p:nvSpPr>
               <p:cNvPr id="7" name="TextBox 6">
@@ -6181,6 +6620,7 @@
               </a:bodyPr>
               <a:lstStyle/>
               <a:p>
+                <a:pPr/>
                 <a14:m>
                   <m:oMathPara xmlns:m="http://schemas.openxmlformats.org/officeDocument/2006/math">
                     <m:oMathParaPr>
@@ -6225,7 +6665,7 @@
             </p:txBody>
           </p:sp>
         </mc:Choice>
-        <mc:Fallback>
+        <mc:Fallback xmlns="">
           <p:sp>
             <p:nvSpPr>
               <p:cNvPr id="7" name="TextBox 6">
@@ -12296,8 +12736,8 @@
           </a:p>
         </p:txBody>
       </p:sp>
-      <mc:AlternateContent xmlns:mc="http://schemas.openxmlformats.org/markup-compatibility/2006">
-        <mc:Choice xmlns:a14="http://schemas.microsoft.com/office/drawing/2010/main" Requires="a14">
+      <mc:AlternateContent xmlns:mc="http://schemas.openxmlformats.org/markup-compatibility/2006" xmlns:a14="http://schemas.microsoft.com/office/drawing/2010/main">
+        <mc:Choice Requires="a14">
           <p:sp>
             <p:nvSpPr>
               <p:cNvPr id="54" name="내용 개체 틀 2">
@@ -12755,7 +13195,7 @@
             </p:txBody>
           </p:sp>
         </mc:Choice>
-        <mc:Fallback>
+        <mc:Fallback xmlns="">
           <p:sp>
             <p:nvSpPr>
               <p:cNvPr id="54" name="내용 개체 틀 2">
@@ -17919,6 +18359,331 @@
       </p:sp>
       <p:sp>
         <p:nvSpPr>
+          <p:cNvPr id="26" name="내용 개체 틀 2">
+            <a:extLst>
+              <a:ext uri="{FF2B5EF4-FFF2-40B4-BE49-F238E27FC236}">
+                <a16:creationId xmlns:a16="http://schemas.microsoft.com/office/drawing/2014/main" id="{756D0AE0-6460-30C1-0865-48A846EE9021}"/>
+              </a:ext>
+            </a:extLst>
+          </p:cNvPr>
+          <p:cNvSpPr>
+            <a:spLocks noGrp="1"/>
+          </p:cNvSpPr>
+          <p:nvPr>
+            <p:ph idx="1"/>
+          </p:nvPr>
+        </p:nvSpPr>
+        <p:spPr>
+          <a:xfrm>
+            <a:off x="838200" y="1825625"/>
+            <a:ext cx="10515600" cy="4351338"/>
+          </a:xfrm>
+        </p:spPr>
+        <p:txBody>
+          <a:bodyPr/>
+          <a:lstStyle/>
+          <a:p>
+            <a:r>
+              <a:rPr kumimoji="1" lang="ko-KR" altLang="en-US" dirty="0">
+                <a:solidFill>
+                  <a:schemeClr val="bg1"/>
+                </a:solidFill>
+                <a:latin typeface="BM HANNA Pro OTF" panose="020B0600000101010101" pitchFamily="34" charset="-127"/>
+                <a:ea typeface="BM HANNA Pro OTF" panose="020B0600000101010101" pitchFamily="34" charset="-127"/>
+              </a:rPr>
+              <a:t>확증적 데이터 분석</a:t>
+            </a:r>
+            <a:endParaRPr kumimoji="1" lang="en-US" altLang="ko-KR" dirty="0">
+              <a:solidFill>
+                <a:schemeClr val="bg1"/>
+              </a:solidFill>
+              <a:latin typeface="BM HANNA Pro OTF" panose="020B0600000101010101" pitchFamily="34" charset="-127"/>
+              <a:ea typeface="BM HANNA Pro OTF" panose="020B0600000101010101" pitchFamily="34" charset="-127"/>
+            </a:endParaRPr>
+          </a:p>
+          <a:p>
+            <a:pPr marL="457200" lvl="1" indent="0">
+              <a:buNone/>
+            </a:pPr>
+            <a:r>
+              <a:rPr kumimoji="1" lang="en-US" altLang="ko-KR" dirty="0">
+                <a:solidFill>
+                  <a:schemeClr val="bg1"/>
+                </a:solidFill>
+                <a:latin typeface="BM HANNA Pro OTF" panose="020B0600000101010101" pitchFamily="34" charset="-127"/>
+                <a:ea typeface="BM HANNA Pro OTF" panose="020B0600000101010101" pitchFamily="34" charset="-127"/>
+              </a:rPr>
+              <a:t>-</a:t>
+            </a:r>
+            <a:r>
+              <a:rPr kumimoji="1" lang="ko-KR" altLang="en-US" dirty="0">
+                <a:solidFill>
+                  <a:schemeClr val="bg1"/>
+                </a:solidFill>
+                <a:latin typeface="BM HANNA Pro OTF" panose="020B0600000101010101" pitchFamily="34" charset="-127"/>
+                <a:ea typeface="BM HANNA Pro OTF" panose="020B0600000101010101" pitchFamily="34" charset="-127"/>
+              </a:rPr>
+              <a:t> 추론통계 </a:t>
+            </a:r>
+            <a:r>
+              <a:rPr kumimoji="1" lang="en-US" altLang="ko-KR" dirty="0">
+                <a:solidFill>
+                  <a:schemeClr val="bg1"/>
+                </a:solidFill>
+                <a:latin typeface="BM HANNA Pro OTF" panose="020B0600000101010101" pitchFamily="34" charset="-127"/>
+                <a:ea typeface="BM HANNA Pro OTF" panose="020B0600000101010101" pitchFamily="34" charset="-127"/>
+              </a:rPr>
+              <a:t>:</a:t>
+            </a:r>
+            <a:r>
+              <a:rPr kumimoji="1" lang="ko-KR" altLang="en-US" dirty="0">
+                <a:solidFill>
+                  <a:schemeClr val="bg1"/>
+                </a:solidFill>
+                <a:latin typeface="BM HANNA Pro OTF" panose="020B0600000101010101" pitchFamily="34" charset="-127"/>
+                <a:ea typeface="BM HANNA Pro OTF" panose="020B0600000101010101" pitchFamily="34" charset="-127"/>
+              </a:rPr>
+              <a:t> 검정</a:t>
+            </a:r>
+            <a:r>
+              <a:rPr kumimoji="1" lang="en-US" altLang="ko-KR" dirty="0">
+                <a:solidFill>
+                  <a:schemeClr val="bg1"/>
+                </a:solidFill>
+                <a:latin typeface="BM HANNA Pro OTF" panose="020B0600000101010101" pitchFamily="34" charset="-127"/>
+                <a:ea typeface="BM HANNA Pro OTF" panose="020B0600000101010101" pitchFamily="34" charset="-127"/>
+              </a:rPr>
+              <a:t>,</a:t>
+            </a:r>
+            <a:r>
+              <a:rPr kumimoji="1" lang="ko-KR" altLang="en-US" dirty="0">
+                <a:solidFill>
+                  <a:schemeClr val="bg1"/>
+                </a:solidFill>
+                <a:latin typeface="BM HANNA Pro OTF" panose="020B0600000101010101" pitchFamily="34" charset="-127"/>
+                <a:ea typeface="BM HANNA Pro OTF" panose="020B0600000101010101" pitchFamily="34" charset="-127"/>
+              </a:rPr>
+              <a:t> 신뢰구간 추정 등</a:t>
+            </a:r>
+            <a:r>
+              <a:rPr kumimoji="1" lang="en-US" altLang="ko-KR" dirty="0">
+                <a:solidFill>
+                  <a:schemeClr val="bg1"/>
+                </a:solidFill>
+                <a:latin typeface="BM HANNA Pro OTF" panose="020B0600000101010101" pitchFamily="34" charset="-127"/>
+                <a:ea typeface="BM HANNA Pro OTF" panose="020B0600000101010101" pitchFamily="34" charset="-127"/>
+              </a:rPr>
+              <a:t>…</a:t>
+            </a:r>
+          </a:p>
+          <a:p>
+            <a:endParaRPr kumimoji="1" lang="en-US" altLang="ko-KR" dirty="0">
+              <a:solidFill>
+                <a:schemeClr val="bg1"/>
+              </a:solidFill>
+              <a:latin typeface="BM HANNA Pro OTF" panose="020B0600000101010101" pitchFamily="34" charset="-127"/>
+              <a:ea typeface="BM HANNA Pro OTF" panose="020B0600000101010101" pitchFamily="34" charset="-127"/>
+            </a:endParaRPr>
+          </a:p>
+          <a:p>
+            <a:r>
+              <a:rPr kumimoji="1" lang="ko-KR" altLang="en-US" dirty="0">
+                <a:solidFill>
+                  <a:schemeClr val="bg1"/>
+                </a:solidFill>
+                <a:latin typeface="BM HANNA Pro OTF" panose="020B0600000101010101" pitchFamily="34" charset="-127"/>
+                <a:ea typeface="BM HANNA Pro OTF" panose="020B0600000101010101" pitchFamily="34" charset="-127"/>
+              </a:rPr>
+              <a:t>탐색적 데이터 분석</a:t>
+            </a:r>
+            <a:endParaRPr kumimoji="1" lang="en-US" altLang="ko-KR" dirty="0">
+              <a:solidFill>
+                <a:schemeClr val="bg1"/>
+              </a:solidFill>
+              <a:latin typeface="BM HANNA Pro OTF" panose="020B0600000101010101" pitchFamily="34" charset="-127"/>
+              <a:ea typeface="BM HANNA Pro OTF" panose="020B0600000101010101" pitchFamily="34" charset="-127"/>
+            </a:endParaRPr>
+          </a:p>
+          <a:p>
+            <a:pPr marL="457200" lvl="1" indent="0">
+              <a:buNone/>
+            </a:pPr>
+            <a:r>
+              <a:rPr kumimoji="1" lang="en-US" altLang="ko-KR" dirty="0">
+                <a:solidFill>
+                  <a:schemeClr val="bg1"/>
+                </a:solidFill>
+                <a:latin typeface="BM HANNA Pro OTF" panose="020B0600000101010101" pitchFamily="34" charset="-127"/>
+                <a:ea typeface="BM HANNA Pro OTF" panose="020B0600000101010101" pitchFamily="34" charset="-127"/>
+              </a:rPr>
+              <a:t>-</a:t>
+            </a:r>
+            <a:r>
+              <a:rPr kumimoji="1" lang="ko-KR" altLang="en-US" dirty="0">
+                <a:solidFill>
+                  <a:schemeClr val="bg1"/>
+                </a:solidFill>
+                <a:latin typeface="BM HANNA Pro OTF" panose="020B0600000101010101" pitchFamily="34" charset="-127"/>
+                <a:ea typeface="BM HANNA Pro OTF" panose="020B0600000101010101" pitchFamily="34" charset="-127"/>
+              </a:rPr>
+              <a:t> 기술통계 </a:t>
+            </a:r>
+            <a:r>
+              <a:rPr kumimoji="1" lang="en-US" altLang="ko-KR" dirty="0">
+                <a:solidFill>
+                  <a:schemeClr val="bg1"/>
+                </a:solidFill>
+                <a:latin typeface="BM HANNA Pro OTF" panose="020B0600000101010101" pitchFamily="34" charset="-127"/>
+                <a:ea typeface="BM HANNA Pro OTF" panose="020B0600000101010101" pitchFamily="34" charset="-127"/>
+              </a:rPr>
+              <a:t>:</a:t>
+            </a:r>
+            <a:r>
+              <a:rPr kumimoji="1" lang="ko-KR" altLang="en-US" dirty="0">
+                <a:solidFill>
+                  <a:schemeClr val="bg1"/>
+                </a:solidFill>
+                <a:latin typeface="BM HANNA Pro OTF" panose="020B0600000101010101" pitchFamily="34" charset="-127"/>
+                <a:ea typeface="BM HANNA Pro OTF" panose="020B0600000101010101" pitchFamily="34" charset="-127"/>
+              </a:rPr>
+              <a:t> </a:t>
+            </a:r>
+            <a:r>
+              <a:rPr kumimoji="1" lang="ko-KR" altLang="en-US" dirty="0" err="1">
+                <a:solidFill>
+                  <a:schemeClr val="bg1"/>
+                </a:solidFill>
+                <a:latin typeface="BM HANNA Pro OTF" panose="020B0600000101010101" pitchFamily="34" charset="-127"/>
+                <a:ea typeface="BM HANNA Pro OTF" panose="020B0600000101010101" pitchFamily="34" charset="-127"/>
+              </a:rPr>
+              <a:t>기술통계량</a:t>
+            </a:r>
+            <a:r>
+              <a:rPr kumimoji="1" lang="en-US" altLang="ko-KR" dirty="0">
+                <a:solidFill>
+                  <a:schemeClr val="bg1"/>
+                </a:solidFill>
+                <a:latin typeface="BM HANNA Pro OTF" panose="020B0600000101010101" pitchFamily="34" charset="-127"/>
+                <a:ea typeface="BM HANNA Pro OTF" panose="020B0600000101010101" pitchFamily="34" charset="-127"/>
+              </a:rPr>
+              <a:t>,</a:t>
+            </a:r>
+            <a:r>
+              <a:rPr kumimoji="1" lang="ko-KR" altLang="en-US" dirty="0">
+                <a:solidFill>
+                  <a:schemeClr val="bg1"/>
+                </a:solidFill>
+                <a:latin typeface="BM HANNA Pro OTF" panose="020B0600000101010101" pitchFamily="34" charset="-127"/>
+                <a:ea typeface="BM HANNA Pro OTF" panose="020B0600000101010101" pitchFamily="34" charset="-127"/>
+              </a:rPr>
+              <a:t> 데이터 분포 등</a:t>
+            </a:r>
+            <a:r>
+              <a:rPr kumimoji="1" lang="en-US" altLang="ko-KR" dirty="0">
+                <a:solidFill>
+                  <a:schemeClr val="bg1"/>
+                </a:solidFill>
+                <a:latin typeface="BM HANNA Pro OTF" panose="020B0600000101010101" pitchFamily="34" charset="-127"/>
+                <a:ea typeface="BM HANNA Pro OTF" panose="020B0600000101010101" pitchFamily="34" charset="-127"/>
+              </a:rPr>
+              <a:t>…</a:t>
+            </a:r>
+          </a:p>
+        </p:txBody>
+      </p:sp>
+    </p:spTree>
+    <p:extLst>
+      <p:ext uri="{BB962C8B-B14F-4D97-AF65-F5344CB8AC3E}">
+        <p14:creationId xmlns:p14="http://schemas.microsoft.com/office/powerpoint/2010/main" val="2717607906"/>
+      </p:ext>
+    </p:extLst>
+  </p:cSld>
+  <p:clrMapOvr>
+    <a:masterClrMapping/>
+  </p:clrMapOvr>
+</p:sld>
+</file>
+
+<file path=ppt/slides/slide26.xml><?xml version="1.0" encoding="utf-8"?>
+<p:sld xmlns:a="http://schemas.openxmlformats.org/drawingml/2006/main" xmlns:r="http://schemas.openxmlformats.org/officeDocument/2006/relationships" xmlns:p="http://schemas.openxmlformats.org/presentationml/2006/main">
+  <p:cSld>
+    <p:spTree>
+      <p:nvGrpSpPr>
+        <p:cNvPr id="1" name=""/>
+        <p:cNvGrpSpPr/>
+        <p:nvPr/>
+      </p:nvGrpSpPr>
+      <p:grpSpPr>
+        <a:xfrm>
+          <a:off x="0" y="0"/>
+          <a:ext cx="0" cy="0"/>
+          <a:chOff x="0" y="0"/>
+          <a:chExt cx="0" cy="0"/>
+        </a:xfrm>
+      </p:grpSpPr>
+      <p:sp>
+        <p:nvSpPr>
+          <p:cNvPr id="2" name="제목 1">
+            <a:extLst>
+              <a:ext uri="{FF2B5EF4-FFF2-40B4-BE49-F238E27FC236}">
+                <a16:creationId xmlns:a16="http://schemas.microsoft.com/office/drawing/2014/main" id="{3E4A44D8-80A4-BFEC-28AF-C565075CAF3A}"/>
+              </a:ext>
+            </a:extLst>
+          </p:cNvPr>
+          <p:cNvSpPr>
+            <a:spLocks noGrp="1"/>
+          </p:cNvSpPr>
+          <p:nvPr>
+            <p:ph type="title"/>
+          </p:nvPr>
+        </p:nvSpPr>
+        <p:spPr/>
+        <p:txBody>
+          <a:bodyPr/>
+          <a:lstStyle/>
+          <a:p>
+            <a:r>
+              <a:rPr kumimoji="1" lang="ko-KR" altLang="en-US" dirty="0">
+                <a:solidFill>
+                  <a:schemeClr val="bg1"/>
+                </a:solidFill>
+                <a:latin typeface="BM HANNA Pro OTF" panose="020B0600000101010101" pitchFamily="34" charset="-127"/>
+                <a:ea typeface="BM HANNA Pro OTF" panose="020B0600000101010101" pitchFamily="34" charset="-127"/>
+              </a:rPr>
+              <a:t>확증적 데이터 분석</a:t>
+            </a:r>
+            <a:r>
+              <a:rPr kumimoji="1" lang="en-US" altLang="ko-KR" sz="2800" dirty="0">
+                <a:solidFill>
+                  <a:schemeClr val="bg1"/>
+                </a:solidFill>
+                <a:latin typeface="BM HANNA Pro OTF" panose="020B0600000101010101" pitchFamily="34" charset="-127"/>
+                <a:ea typeface="BM HANNA Pro OTF" panose="020B0600000101010101" pitchFamily="34" charset="-127"/>
+              </a:rPr>
+              <a:t>(</a:t>
+            </a:r>
+            <a:r>
+              <a:rPr lang="en" altLang="ko-Kore-KR" sz="2800" dirty="0">
+                <a:solidFill>
+                  <a:srgbClr val="F5E3EF"/>
+                </a:solidFill>
+                <a:latin typeface="BM HANNA Pro OTF" panose="020B0600000101010101" pitchFamily="34" charset="-127"/>
+                <a:ea typeface="BM HANNA Pro OTF" panose="020B0600000101010101" pitchFamily="34" charset="-127"/>
+              </a:rPr>
+              <a:t>Confirmatory Data Analysis, CDA)</a:t>
+            </a:r>
+            <a:endParaRPr kumimoji="1" lang="ko-Kore-KR" altLang="en-US" dirty="0">
+              <a:solidFill>
+                <a:srgbClr val="F5E3EF"/>
+              </a:solidFill>
+              <a:latin typeface="BM HANNA Pro OTF" panose="020B0600000101010101" pitchFamily="34" charset="-127"/>
+              <a:ea typeface="BM HANNA Pro OTF" panose="020B0600000101010101" pitchFamily="34" charset="-127"/>
+            </a:endParaRPr>
+          </a:p>
+        </p:txBody>
+      </p:sp>
+      <p:sp>
+        <p:nvSpPr>
           <p:cNvPr id="4" name="직사각형 3">
             <a:extLst>
               <a:ext uri="{FF2B5EF4-FFF2-40B4-BE49-F238E27FC236}">
@@ -18515,7 +19280,7 @@
               </a:rPr>
               <a:t>모델링</a:t>
             </a:r>
-            <a:endParaRPr kumimoji="1" lang="ko-Kore-KR" altLang="en-US" b="1" dirty="0">
+            <a:endParaRPr kumimoji="1" lang="en-US" altLang="ko-KR" b="1" dirty="0">
               <a:solidFill>
                 <a:schemeClr val="tx1"/>
               </a:solidFill>
@@ -18951,327 +19716,592 @@
           </a:fontRef>
         </p:style>
       </p:cxnSp>
+    </p:spTree>
+    <p:extLst>
+      <p:ext uri="{BB962C8B-B14F-4D97-AF65-F5344CB8AC3E}">
+        <p14:creationId xmlns:p14="http://schemas.microsoft.com/office/powerpoint/2010/main" val="1403692677"/>
+      </p:ext>
+    </p:extLst>
+  </p:cSld>
+  <p:clrMapOvr>
+    <a:masterClrMapping/>
+  </p:clrMapOvr>
+</p:sld>
+</file>
+
+<file path=ppt/slides/slide27.xml><?xml version="1.0" encoding="utf-8"?>
+<p:sld xmlns:a="http://schemas.openxmlformats.org/drawingml/2006/main" xmlns:r="http://schemas.openxmlformats.org/officeDocument/2006/relationships" xmlns:p="http://schemas.openxmlformats.org/presentationml/2006/main">
+  <p:cSld>
+    <p:spTree>
+      <p:nvGrpSpPr>
+        <p:cNvPr id="1" name=""/>
+        <p:cNvGrpSpPr/>
+        <p:nvPr/>
+      </p:nvGrpSpPr>
+      <p:grpSpPr>
+        <a:xfrm>
+          <a:off x="0" y="0"/>
+          <a:ext cx="0" cy="0"/>
+          <a:chOff x="0" y="0"/>
+          <a:chExt cx="0" cy="0"/>
+        </a:xfrm>
+      </p:grpSpPr>
       <p:sp>
         <p:nvSpPr>
-          <p:cNvPr id="41" name="TextBox 40">
+          <p:cNvPr id="2" name="제목 1">
             <a:extLst>
               <a:ext uri="{FF2B5EF4-FFF2-40B4-BE49-F238E27FC236}">
-                <a16:creationId xmlns:a16="http://schemas.microsoft.com/office/drawing/2014/main" id="{9835F571-101E-CB58-DD44-1A6A2AD53788}"/>
+                <a16:creationId xmlns:a16="http://schemas.microsoft.com/office/drawing/2014/main" id="{3E4A44D8-80A4-BFEC-28AF-C565075CAF3A}"/>
               </a:ext>
             </a:extLst>
           </p:cNvPr>
-          <p:cNvSpPr txBox="1"/>
-          <p:nvPr/>
+          <p:cNvSpPr>
+            <a:spLocks noGrp="1"/>
+          </p:cNvSpPr>
+          <p:nvPr>
+            <p:ph type="title"/>
+          </p:nvPr>
         </p:nvSpPr>
-        <p:spPr>
-          <a:xfrm>
-            <a:off x="591015" y="2019291"/>
-            <a:ext cx="2042547" cy="584775"/>
-          </a:xfrm>
-          <a:prstGeom prst="rect">
-            <a:avLst/>
-          </a:prstGeom>
-          <a:noFill/>
-        </p:spPr>
+        <p:spPr/>
         <p:txBody>
-          <a:bodyPr wrap="none" rtlCol="0">
-            <a:spAutoFit/>
-          </a:bodyPr>
+          <a:bodyPr/>
           <a:lstStyle/>
           <a:p>
             <a:r>
-              <a:rPr kumimoji="1" lang="ko-Kore-KR" altLang="en-US" sz="1600" b="1" dirty="0">
-                <a:latin typeface="+mj-ea"/>
-                <a:ea typeface="+mj-ea"/>
-              </a:rPr>
-              <a:t>선행</a:t>
-            </a:r>
-            <a:r>
-              <a:rPr kumimoji="1" lang="ko-KR" altLang="en-US" sz="1600" b="1" dirty="0">
-                <a:latin typeface="+mj-ea"/>
-                <a:ea typeface="+mj-ea"/>
-              </a:rPr>
-              <a:t> 연구 </a:t>
-            </a:r>
-            <a:r>
-              <a:rPr kumimoji="1" lang="ko-Kore-KR" altLang="en-US" sz="1600" b="1" dirty="0">
-                <a:latin typeface="+mj-ea"/>
-                <a:ea typeface="+mj-ea"/>
-              </a:rPr>
-              <a:t>조사</a:t>
-            </a:r>
-            <a:endParaRPr kumimoji="1" lang="en-US" altLang="ko-Kore-KR" sz="1600" b="1" dirty="0">
-              <a:latin typeface="+mj-ea"/>
-              <a:ea typeface="+mj-ea"/>
-            </a:endParaRPr>
-          </a:p>
-          <a:p>
-            <a:r>
-              <a:rPr kumimoji="1" lang="ko-Kore-KR" altLang="en-US" sz="1600" b="1" dirty="0">
-                <a:latin typeface="+mj-ea"/>
-                <a:ea typeface="+mj-ea"/>
-              </a:rPr>
-              <a:t>연구</a:t>
-            </a:r>
-            <a:r>
-              <a:rPr kumimoji="1" lang="ko-KR" altLang="en-US" sz="1600" b="1" dirty="0">
-                <a:latin typeface="+mj-ea"/>
-                <a:ea typeface="+mj-ea"/>
-              </a:rPr>
-              <a:t> 중복 여부 조사</a:t>
-            </a:r>
-            <a:endParaRPr kumimoji="1" lang="en-US" altLang="ko-KR" sz="1600" b="1" dirty="0">
-              <a:latin typeface="+mj-ea"/>
-              <a:ea typeface="+mj-ea"/>
+              <a:rPr kumimoji="1" lang="ko-KR" altLang="en-US" dirty="0">
+                <a:solidFill>
+                  <a:schemeClr val="bg1"/>
+                </a:solidFill>
+                <a:latin typeface="BM HANNA Pro OTF" panose="020B0600000101010101" pitchFamily="34" charset="-127"/>
+                <a:ea typeface="BM HANNA Pro OTF" panose="020B0600000101010101" pitchFamily="34" charset="-127"/>
+              </a:rPr>
+              <a:t>탐색적 데이터 분석</a:t>
+            </a:r>
+            <a:r>
+              <a:rPr kumimoji="1" lang="en-US" altLang="ko-KR" sz="2800" dirty="0">
+                <a:solidFill>
+                  <a:schemeClr val="bg1"/>
+                </a:solidFill>
+                <a:latin typeface="BM HANNA Pro OTF" panose="020B0600000101010101" pitchFamily="34" charset="-127"/>
+                <a:ea typeface="BM HANNA Pro OTF" panose="020B0600000101010101" pitchFamily="34" charset="-127"/>
+              </a:rPr>
+              <a:t>(</a:t>
+            </a:r>
+            <a:r>
+              <a:rPr lang="en" altLang="ko-Kore-KR" sz="2800" dirty="0">
+                <a:solidFill>
+                  <a:srgbClr val="F5E3EF"/>
+                </a:solidFill>
+                <a:latin typeface="BM HANNA Pro OTF" panose="020B0600000101010101" pitchFamily="34" charset="-127"/>
+                <a:ea typeface="BM HANNA Pro OTF" panose="020B0600000101010101" pitchFamily="34" charset="-127"/>
+              </a:rPr>
+              <a:t>Exploratory Data Analysis, CDA)</a:t>
+            </a:r>
+            <a:endParaRPr kumimoji="1" lang="ko-Kore-KR" altLang="en-US" dirty="0">
+              <a:solidFill>
+                <a:srgbClr val="F5E3EF"/>
+              </a:solidFill>
+              <a:latin typeface="BM HANNA Pro OTF" panose="020B0600000101010101" pitchFamily="34" charset="-127"/>
+              <a:ea typeface="BM HANNA Pro OTF" panose="020B0600000101010101" pitchFamily="34" charset="-127"/>
             </a:endParaRPr>
           </a:p>
         </p:txBody>
       </p:sp>
       <p:sp>
         <p:nvSpPr>
-          <p:cNvPr id="42" name="TextBox 41">
+          <p:cNvPr id="4" name="직사각형 3">
             <a:extLst>
               <a:ext uri="{FF2B5EF4-FFF2-40B4-BE49-F238E27FC236}">
-                <a16:creationId xmlns:a16="http://schemas.microsoft.com/office/drawing/2014/main" id="{D5069AEC-E6A8-C7B3-923B-BF41CDC913A7}"/>
+                <a16:creationId xmlns:a16="http://schemas.microsoft.com/office/drawing/2014/main" id="{E2066A72-A733-B0AC-D21A-528DFF375ECB}"/>
               </a:ext>
             </a:extLst>
           </p:cNvPr>
-          <p:cNvSpPr txBox="1"/>
+          <p:cNvSpPr/>
           <p:nvPr/>
         </p:nvSpPr>
         <p:spPr>
           <a:xfrm>
-            <a:off x="6254692" y="2263152"/>
-            <a:ext cx="1196161" cy="338554"/>
+            <a:off x="329681" y="1426353"/>
+            <a:ext cx="11532637" cy="5066522"/>
           </a:xfrm>
           <a:prstGeom prst="rect">
             <a:avLst/>
           </a:prstGeom>
-          <a:noFill/>
+          <a:solidFill>
+            <a:schemeClr val="bg1"/>
+          </a:solidFill>
+          <a:ln>
+            <a:solidFill>
+              <a:schemeClr val="bg1"/>
+            </a:solidFill>
+          </a:ln>
         </p:spPr>
+        <p:style>
+          <a:lnRef idx="2">
+            <a:schemeClr val="accent1">
+              <a:shade val="50000"/>
+            </a:schemeClr>
+          </a:lnRef>
+          <a:fillRef idx="1">
+            <a:schemeClr val="accent1"/>
+          </a:fillRef>
+          <a:effectRef idx="0">
+            <a:schemeClr val="accent1"/>
+          </a:effectRef>
+          <a:fontRef idx="minor">
+            <a:schemeClr val="lt1"/>
+          </a:fontRef>
+        </p:style>
         <p:txBody>
-          <a:bodyPr wrap="none" rtlCol="0">
-            <a:spAutoFit/>
-          </a:bodyPr>
+          <a:bodyPr rtlCol="0" anchor="ctr"/>
           <a:lstStyle/>
           <a:p>
-            <a:r>
-              <a:rPr kumimoji="1" lang="en-US" altLang="ko-KR" sz="1600" b="1" dirty="0">
-                <a:latin typeface="+mj-ea"/>
-                <a:ea typeface="+mj-ea"/>
-              </a:rPr>
-              <a:t>6</a:t>
-            </a:r>
-            <a:r>
-              <a:rPr kumimoji="1" lang="ko-KR" altLang="en-US" sz="1600" b="1" dirty="0">
-                <a:latin typeface="+mj-ea"/>
-                <a:ea typeface="+mj-ea"/>
-              </a:rPr>
-              <a:t>주차 내용</a:t>
-            </a:r>
-            <a:endParaRPr kumimoji="1" lang="en-US" altLang="ko-KR" sz="1600" b="1" dirty="0">
-              <a:latin typeface="+mj-ea"/>
-              <a:ea typeface="+mj-ea"/>
+            <a:pPr algn="ctr"/>
+            <a:endParaRPr kumimoji="1" lang="ko-Kore-KR" altLang="en-US" dirty="0"/>
+          </a:p>
+        </p:txBody>
+      </p:sp>
+      <p:sp>
+        <p:nvSpPr>
+          <p:cNvPr id="3" name="직사각형 2">
+            <a:extLst>
+              <a:ext uri="{FF2B5EF4-FFF2-40B4-BE49-F238E27FC236}">
+                <a16:creationId xmlns:a16="http://schemas.microsoft.com/office/drawing/2014/main" id="{11CA819A-4AD8-322F-4658-0B2A7B0791FF}"/>
+              </a:ext>
+            </a:extLst>
+          </p:cNvPr>
+          <p:cNvSpPr/>
+          <p:nvPr/>
+        </p:nvSpPr>
+        <p:spPr>
+          <a:xfrm>
+            <a:off x="1155058" y="3429003"/>
+            <a:ext cx="2185639" cy="1078935"/>
+          </a:xfrm>
+          <a:prstGeom prst="rect">
+            <a:avLst/>
+          </a:prstGeom>
+          <a:solidFill>
+            <a:schemeClr val="bg1">
+              <a:lumMod val="75000"/>
+            </a:schemeClr>
+          </a:solidFill>
+        </p:spPr>
+        <p:style>
+          <a:lnRef idx="2">
+            <a:schemeClr val="accent1">
+              <a:shade val="50000"/>
+            </a:schemeClr>
+          </a:lnRef>
+          <a:fillRef idx="1">
+            <a:schemeClr val="accent1"/>
+          </a:fillRef>
+          <a:effectRef idx="0">
+            <a:schemeClr val="accent1"/>
+          </a:effectRef>
+          <a:fontRef idx="minor">
+            <a:schemeClr val="lt1"/>
+          </a:fontRef>
+        </p:style>
+        <p:txBody>
+          <a:bodyPr rtlCol="0" anchor="ctr"/>
+          <a:lstStyle/>
+          <a:p>
+            <a:pPr algn="ctr"/>
+            <a:r>
+              <a:rPr kumimoji="1" lang="ko-KR" altLang="en-US" b="1" dirty="0">
+                <a:solidFill>
+                  <a:schemeClr val="tx1"/>
+                </a:solidFill>
+              </a:rPr>
+              <a:t>데이터 수집</a:t>
+            </a:r>
+            <a:endParaRPr kumimoji="1" lang="ko-Kore-KR" altLang="en-US" b="1" dirty="0">
+              <a:solidFill>
+                <a:schemeClr val="tx1"/>
+              </a:solidFill>
             </a:endParaRPr>
           </a:p>
         </p:txBody>
       </p:sp>
       <p:sp>
         <p:nvSpPr>
-          <p:cNvPr id="43" name="TextBox 42">
+          <p:cNvPr id="16" name="직사각형 15">
             <a:extLst>
               <a:ext uri="{FF2B5EF4-FFF2-40B4-BE49-F238E27FC236}">
-                <a16:creationId xmlns:a16="http://schemas.microsoft.com/office/drawing/2014/main" id="{6EC07BAA-19DC-82E6-235A-AFCF0C9A51BA}"/>
+                <a16:creationId xmlns:a16="http://schemas.microsoft.com/office/drawing/2014/main" id="{2CAF971A-B9F0-591B-B64E-A0795F774501}"/>
               </a:ext>
             </a:extLst>
           </p:cNvPr>
-          <p:cNvSpPr txBox="1"/>
+          <p:cNvSpPr/>
           <p:nvPr/>
         </p:nvSpPr>
         <p:spPr>
           <a:xfrm>
-            <a:off x="6244846" y="3997399"/>
-            <a:ext cx="1282723" cy="338554"/>
+            <a:off x="3752722" y="3429002"/>
+            <a:ext cx="2185639" cy="1078935"/>
           </a:xfrm>
           <a:prstGeom prst="rect">
             <a:avLst/>
           </a:prstGeom>
-          <a:noFill/>
+          <a:solidFill>
+            <a:schemeClr val="bg1">
+              <a:lumMod val="75000"/>
+            </a:schemeClr>
+          </a:solidFill>
         </p:spPr>
+        <p:style>
+          <a:lnRef idx="2">
+            <a:schemeClr val="accent1">
+              <a:shade val="50000"/>
+            </a:schemeClr>
+          </a:lnRef>
+          <a:fillRef idx="1">
+            <a:schemeClr val="accent1"/>
+          </a:fillRef>
+          <a:effectRef idx="0">
+            <a:schemeClr val="accent1"/>
+          </a:effectRef>
+          <a:fontRef idx="minor">
+            <a:schemeClr val="lt1"/>
+          </a:fontRef>
+        </p:style>
         <p:txBody>
-          <a:bodyPr wrap="none" rtlCol="0">
-            <a:spAutoFit/>
-          </a:bodyPr>
+          <a:bodyPr rtlCol="0" anchor="ctr"/>
           <a:lstStyle/>
           <a:p>
-            <a:r>
-              <a:rPr kumimoji="1" lang="ko-KR" altLang="en-US" sz="1600" b="1" dirty="0">
-                <a:latin typeface="+mj-ea"/>
-                <a:ea typeface="+mj-ea"/>
-              </a:rPr>
-              <a:t>다음주 내용</a:t>
-            </a:r>
-            <a:endParaRPr kumimoji="1" lang="en-US" altLang="ko-KR" sz="1600" b="1" dirty="0">
-              <a:latin typeface="+mj-ea"/>
-              <a:ea typeface="+mj-ea"/>
+            <a:pPr algn="ctr"/>
+            <a:r>
+              <a:rPr kumimoji="1" lang="ko-KR" altLang="en-US" b="1" dirty="0">
+                <a:solidFill>
+                  <a:schemeClr val="tx1"/>
+                </a:solidFill>
+              </a:rPr>
+              <a:t>기술통계</a:t>
+            </a:r>
+            <a:r>
+              <a:rPr kumimoji="1" lang="en-US" altLang="ko-KR" b="1" dirty="0">
+                <a:solidFill>
+                  <a:schemeClr val="tx1"/>
+                </a:solidFill>
+              </a:rPr>
+              <a:t>,</a:t>
+            </a:r>
+            <a:r>
+              <a:rPr kumimoji="1" lang="ko-KR" altLang="en-US" b="1" dirty="0">
+                <a:solidFill>
+                  <a:schemeClr val="tx1"/>
+                </a:solidFill>
+              </a:rPr>
+              <a:t> 시각화 등으로 탐색</a:t>
+            </a:r>
+            <a:endParaRPr kumimoji="1" lang="ko-Kore-KR" altLang="en-US" b="1" dirty="0">
+              <a:solidFill>
+                <a:schemeClr val="tx1"/>
+              </a:solidFill>
+            </a:endParaRPr>
+          </a:p>
+        </p:txBody>
+      </p:sp>
+      <p:cxnSp>
+        <p:nvCxnSpPr>
+          <p:cNvPr id="9" name="직선 화살표 연결선 8">
+            <a:extLst>
+              <a:ext uri="{FF2B5EF4-FFF2-40B4-BE49-F238E27FC236}">
+                <a16:creationId xmlns:a16="http://schemas.microsoft.com/office/drawing/2014/main" id="{DDEFC2DF-C7FC-75E1-5C54-389BF7133A31}"/>
+              </a:ext>
+            </a:extLst>
+          </p:cNvPr>
+          <p:cNvCxnSpPr>
+            <a:cxnSpLocks/>
+            <a:stCxn id="3" idx="3"/>
+            <a:endCxn id="16" idx="1"/>
+          </p:cNvCxnSpPr>
+          <p:nvPr/>
+        </p:nvCxnSpPr>
+        <p:spPr>
+          <a:xfrm flipV="1">
+            <a:off x="3340697" y="3968470"/>
+            <a:ext cx="412025" cy="1"/>
+          </a:xfrm>
+          <a:prstGeom prst="straightConnector1">
+            <a:avLst/>
+          </a:prstGeom>
+          <a:ln w="63500">
+            <a:tailEnd type="triangle"/>
+          </a:ln>
+        </p:spPr>
+        <p:style>
+          <a:lnRef idx="1">
+            <a:schemeClr val="dk1"/>
+          </a:lnRef>
+          <a:fillRef idx="0">
+            <a:schemeClr val="dk1"/>
+          </a:fillRef>
+          <a:effectRef idx="0">
+            <a:schemeClr val="dk1"/>
+          </a:effectRef>
+          <a:fontRef idx="minor">
+            <a:schemeClr val="tx1"/>
+          </a:fontRef>
+        </p:style>
+      </p:cxnSp>
+      <p:sp>
+        <p:nvSpPr>
+          <p:cNvPr id="20" name="직사각형 19">
+            <a:extLst>
+              <a:ext uri="{FF2B5EF4-FFF2-40B4-BE49-F238E27FC236}">
+                <a16:creationId xmlns:a16="http://schemas.microsoft.com/office/drawing/2014/main" id="{E3439483-22D9-DDA2-301B-150BA4E0F3DE}"/>
+              </a:ext>
+            </a:extLst>
+          </p:cNvPr>
+          <p:cNvSpPr/>
+          <p:nvPr/>
+        </p:nvSpPr>
+        <p:spPr>
+          <a:xfrm>
+            <a:off x="6350386" y="3429001"/>
+            <a:ext cx="2185639" cy="1078935"/>
+          </a:xfrm>
+          <a:prstGeom prst="rect">
+            <a:avLst/>
+          </a:prstGeom>
+          <a:solidFill>
+            <a:schemeClr val="bg1">
+              <a:lumMod val="75000"/>
+            </a:schemeClr>
+          </a:solidFill>
+        </p:spPr>
+        <p:style>
+          <a:lnRef idx="2">
+            <a:schemeClr val="accent1">
+              <a:shade val="50000"/>
+            </a:schemeClr>
+          </a:lnRef>
+          <a:fillRef idx="1">
+            <a:schemeClr val="accent1"/>
+          </a:fillRef>
+          <a:effectRef idx="0">
+            <a:schemeClr val="accent1"/>
+          </a:effectRef>
+          <a:fontRef idx="minor">
+            <a:schemeClr val="lt1"/>
+          </a:fontRef>
+        </p:style>
+        <p:txBody>
+          <a:bodyPr rtlCol="0" anchor="ctr"/>
+          <a:lstStyle/>
+          <a:p>
+            <a:pPr algn="ctr"/>
+            <a:r>
+              <a:rPr kumimoji="1" lang="ko-KR" altLang="en-US" b="1" dirty="0">
+                <a:solidFill>
+                  <a:schemeClr val="tx1"/>
+                </a:solidFill>
+              </a:rPr>
+              <a:t>유의미한 패턴 검출</a:t>
+            </a:r>
+            <a:endParaRPr kumimoji="1" lang="ko-Kore-KR" altLang="en-US" b="1" dirty="0">
+              <a:solidFill>
+                <a:schemeClr val="tx1"/>
+              </a:solidFill>
             </a:endParaRPr>
           </a:p>
         </p:txBody>
       </p:sp>
       <p:sp>
         <p:nvSpPr>
-          <p:cNvPr id="44" name="TextBox 43">
+          <p:cNvPr id="24" name="직사각형 23">
             <a:extLst>
               <a:ext uri="{FF2B5EF4-FFF2-40B4-BE49-F238E27FC236}">
-                <a16:creationId xmlns:a16="http://schemas.microsoft.com/office/drawing/2014/main" id="{AC6EFB0A-C05E-1C97-95AB-220386A3D239}"/>
+                <a16:creationId xmlns:a16="http://schemas.microsoft.com/office/drawing/2014/main" id="{22AC12C5-4F3D-7A92-BAFB-2C3C31608709}"/>
               </a:ext>
             </a:extLst>
           </p:cNvPr>
-          <p:cNvSpPr txBox="1"/>
+          <p:cNvSpPr/>
           <p:nvPr/>
         </p:nvSpPr>
         <p:spPr>
           <a:xfrm>
-            <a:off x="3657028" y="2255405"/>
-            <a:ext cx="1077539" cy="338554"/>
+            <a:off x="8948050" y="3429000"/>
+            <a:ext cx="2185639" cy="1078935"/>
           </a:xfrm>
           <a:prstGeom prst="rect">
             <a:avLst/>
           </a:prstGeom>
-          <a:noFill/>
+          <a:solidFill>
+            <a:schemeClr val="bg1">
+              <a:lumMod val="75000"/>
+            </a:schemeClr>
+          </a:solidFill>
         </p:spPr>
+        <p:style>
+          <a:lnRef idx="2">
+            <a:schemeClr val="accent1">
+              <a:shade val="50000"/>
+            </a:schemeClr>
+          </a:lnRef>
+          <a:fillRef idx="1">
+            <a:schemeClr val="accent1"/>
+          </a:fillRef>
+          <a:effectRef idx="0">
+            <a:schemeClr val="accent1"/>
+          </a:effectRef>
+          <a:fontRef idx="minor">
+            <a:schemeClr val="lt1"/>
+          </a:fontRef>
+        </p:style>
         <p:txBody>
-          <a:bodyPr wrap="none" rtlCol="0">
-            <a:spAutoFit/>
-          </a:bodyPr>
+          <a:bodyPr rtlCol="0" anchor="ctr"/>
           <a:lstStyle/>
           <a:p>
-            <a:r>
-              <a:rPr kumimoji="1" lang="ko-KR" altLang="en-US" sz="1600" b="1" dirty="0">
-                <a:latin typeface="+mj-ea"/>
-                <a:ea typeface="+mj-ea"/>
-              </a:rPr>
-              <a:t>오늘 내용</a:t>
-            </a:r>
-            <a:endParaRPr kumimoji="1" lang="en-US" altLang="ko-KR" sz="1600" b="1" dirty="0">
-              <a:latin typeface="+mj-ea"/>
-              <a:ea typeface="+mj-ea"/>
+            <a:pPr algn="ctr"/>
+            <a:r>
+              <a:rPr kumimoji="1" lang="ko-KR" altLang="en-US" b="1" dirty="0">
+                <a:solidFill>
+                  <a:schemeClr val="tx1"/>
+                </a:solidFill>
+              </a:rPr>
+              <a:t>결과 분석</a:t>
+            </a:r>
+            <a:endParaRPr kumimoji="1" lang="en-US" altLang="ko-KR" b="1" dirty="0">
+              <a:solidFill>
+                <a:schemeClr val="tx1"/>
+              </a:solidFill>
+            </a:endParaRPr>
+          </a:p>
+          <a:p>
+            <a:pPr algn="ctr"/>
+            <a:r>
+              <a:rPr kumimoji="1" lang="en-US" altLang="ko-KR" b="1" dirty="0">
+                <a:solidFill>
+                  <a:schemeClr val="tx1"/>
+                </a:solidFill>
+              </a:rPr>
+              <a:t>&amp;</a:t>
+            </a:r>
+          </a:p>
+          <a:p>
+            <a:pPr algn="ctr"/>
+            <a:r>
+              <a:rPr kumimoji="1" lang="ko-KR" altLang="en-US" b="1" dirty="0">
+                <a:solidFill>
+                  <a:schemeClr val="tx1"/>
+                </a:solidFill>
+              </a:rPr>
+              <a:t>논문</a:t>
+            </a:r>
+            <a:r>
+              <a:rPr kumimoji="1" lang="en-US" altLang="ko-KR" b="1" dirty="0">
+                <a:solidFill>
+                  <a:schemeClr val="tx1"/>
+                </a:solidFill>
+              </a:rPr>
+              <a:t>,</a:t>
+            </a:r>
+            <a:r>
+              <a:rPr kumimoji="1" lang="ko-KR" altLang="en-US" b="1" dirty="0">
+                <a:solidFill>
+                  <a:schemeClr val="tx1"/>
+                </a:solidFill>
+              </a:rPr>
+              <a:t> 보고서 작성</a:t>
+            </a:r>
+            <a:endParaRPr kumimoji="1" lang="ko-Kore-KR" altLang="en-US" b="1" dirty="0">
+              <a:solidFill>
+                <a:schemeClr val="tx1"/>
+              </a:solidFill>
             </a:endParaRPr>
           </a:p>
         </p:txBody>
       </p:sp>
-      <p:sp>
-        <p:nvSpPr>
-          <p:cNvPr id="45" name="TextBox 44">
+      <p:cxnSp>
+        <p:nvCxnSpPr>
+          <p:cNvPr id="33" name="직선 화살표 연결선 32">
             <a:extLst>
               <a:ext uri="{FF2B5EF4-FFF2-40B4-BE49-F238E27FC236}">
-                <a16:creationId xmlns:a16="http://schemas.microsoft.com/office/drawing/2014/main" id="{CBE15006-485F-3B6A-4C73-C36C95253498}"/>
+                <a16:creationId xmlns:a16="http://schemas.microsoft.com/office/drawing/2014/main" id="{69EAF8A6-3D43-009F-E05E-E16A2EA56367}"/>
               </a:ext>
             </a:extLst>
           </p:cNvPr>
-          <p:cNvSpPr txBox="1"/>
+          <p:cNvCxnSpPr>
+            <a:cxnSpLocks/>
+            <a:stCxn id="16" idx="3"/>
+          </p:cNvCxnSpPr>
           <p:nvPr/>
-        </p:nvSpPr>
+        </p:nvCxnSpPr>
         <p:spPr>
-          <a:xfrm>
-            <a:off x="8852357" y="2261169"/>
-            <a:ext cx="1077539" cy="338554"/>
+          <a:xfrm flipV="1">
+            <a:off x="5938361" y="3968467"/>
+            <a:ext cx="412024" cy="3"/>
           </a:xfrm>
-          <a:prstGeom prst="rect">
+          <a:prstGeom prst="straightConnector1">
             <a:avLst/>
           </a:prstGeom>
-          <a:noFill/>
+          <a:ln w="63500">
+            <a:tailEnd type="triangle"/>
+          </a:ln>
         </p:spPr>
-        <p:txBody>
-          <a:bodyPr wrap="none" rtlCol="0">
-            <a:spAutoFit/>
-          </a:bodyPr>
-          <a:lstStyle/>
-          <a:p>
-            <a:r>
-              <a:rPr kumimoji="1" lang="ko-KR" altLang="en-US" sz="1600" b="1" dirty="0">
-                <a:latin typeface="+mj-ea"/>
-                <a:ea typeface="+mj-ea"/>
-              </a:rPr>
-              <a:t>오늘 내용</a:t>
-            </a:r>
-            <a:endParaRPr kumimoji="1" lang="en-US" altLang="ko-KR" sz="1600" b="1" dirty="0">
-              <a:latin typeface="+mj-ea"/>
-              <a:ea typeface="+mj-ea"/>
-            </a:endParaRPr>
-          </a:p>
-        </p:txBody>
-      </p:sp>
-      <p:sp>
-        <p:nvSpPr>
-          <p:cNvPr id="46" name="TextBox 45">
+        <p:style>
+          <a:lnRef idx="1">
+            <a:schemeClr val="dk1"/>
+          </a:lnRef>
+          <a:fillRef idx="0">
+            <a:schemeClr val="dk1"/>
+          </a:fillRef>
+          <a:effectRef idx="0">
+            <a:schemeClr val="dk1"/>
+          </a:effectRef>
+          <a:fontRef idx="minor">
+            <a:schemeClr val="tx1"/>
+          </a:fontRef>
+        </p:style>
+      </p:cxnSp>
+      <p:cxnSp>
+        <p:nvCxnSpPr>
+          <p:cNvPr id="34" name="직선 화살표 연결선 33">
             <a:extLst>
               <a:ext uri="{FF2B5EF4-FFF2-40B4-BE49-F238E27FC236}">
-                <a16:creationId xmlns:a16="http://schemas.microsoft.com/office/drawing/2014/main" id="{5070575B-5B83-D5AA-9675-C42FD11D9CB9}"/>
+                <a16:creationId xmlns:a16="http://schemas.microsoft.com/office/drawing/2014/main" id="{DB32AA02-7D13-B798-CF0F-32AD81B26122}"/>
               </a:ext>
             </a:extLst>
           </p:cNvPr>
-          <p:cNvSpPr txBox="1"/>
+          <p:cNvCxnSpPr>
+            <a:cxnSpLocks/>
+          </p:cNvCxnSpPr>
           <p:nvPr/>
-        </p:nvSpPr>
+        </p:nvCxnSpPr>
         <p:spPr>
-          <a:xfrm>
-            <a:off x="2589989" y="3968415"/>
-            <a:ext cx="2073003" cy="338554"/>
+          <a:xfrm flipV="1">
+            <a:off x="8536025" y="3968467"/>
+            <a:ext cx="412025" cy="1"/>
           </a:xfrm>
-          <a:prstGeom prst="rect">
+          <a:prstGeom prst="straightConnector1">
             <a:avLst/>
           </a:prstGeom>
-          <a:noFill/>
+          <a:ln w="63500">
+            <a:tailEnd type="triangle"/>
+          </a:ln>
         </p:spPr>
-        <p:txBody>
-          <a:bodyPr wrap="none" rtlCol="0">
-            <a:spAutoFit/>
-          </a:bodyPr>
-          <a:lstStyle/>
-          <a:p>
-            <a:r>
-              <a:rPr kumimoji="1" lang="en-US" altLang="ko-KR" sz="1600" b="1" dirty="0">
-                <a:latin typeface="+mj-ea"/>
-                <a:ea typeface="+mj-ea"/>
-              </a:rPr>
-              <a:t>7~10</a:t>
-            </a:r>
-            <a:r>
-              <a:rPr kumimoji="1" lang="ko-KR" altLang="en-US" sz="1600" b="1" dirty="0">
-                <a:latin typeface="+mj-ea"/>
-                <a:ea typeface="+mj-ea"/>
-              </a:rPr>
-              <a:t>주차 내용 </a:t>
-            </a:r>
-            <a:r>
-              <a:rPr kumimoji="1" lang="en-US" altLang="ko-KR" sz="1600" b="1" dirty="0">
-                <a:latin typeface="+mj-ea"/>
-                <a:ea typeface="+mj-ea"/>
-              </a:rPr>
-              <a:t>+</a:t>
-            </a:r>
-            <a:r>
-              <a:rPr kumimoji="1" lang="ko-KR" altLang="en-US" sz="1600" b="1" dirty="0">
-                <a:latin typeface="+mj-ea"/>
-                <a:ea typeface="+mj-ea"/>
-              </a:rPr>
-              <a:t> </a:t>
-            </a:r>
-            <a:r>
-              <a:rPr kumimoji="1" lang="en-US" altLang="ko-KR" sz="1600" b="1" dirty="0">
-                <a:latin typeface="+mj-ea"/>
-                <a:ea typeface="+mj-ea"/>
-              </a:rPr>
-              <a:t>@</a:t>
-            </a:r>
-          </a:p>
-        </p:txBody>
-      </p:sp>
+        <p:style>
+          <a:lnRef idx="1">
+            <a:schemeClr val="dk1"/>
+          </a:lnRef>
+          <a:fillRef idx="0">
+            <a:schemeClr val="dk1"/>
+          </a:fillRef>
+          <a:effectRef idx="0">
+            <a:schemeClr val="dk1"/>
+          </a:effectRef>
+          <a:fontRef idx="minor">
+            <a:schemeClr val="tx1"/>
+          </a:fontRef>
+        </p:style>
+      </p:cxnSp>
     </p:spTree>
     <p:extLst>
       <p:ext uri="{BB962C8B-B14F-4D97-AF65-F5344CB8AC3E}">
-        <p14:creationId xmlns:p14="http://schemas.microsoft.com/office/powerpoint/2010/main" val="2717607906"/>
+        <p14:creationId xmlns:p14="http://schemas.microsoft.com/office/powerpoint/2010/main" val="2676384516"/>
       </p:ext>
     </p:extLst>
   </p:cSld>
@@ -31803,4 +32833,299 @@
     </a:ext>
   </a:extLst>
 </a:theme>
+</file>
+
+<file path=ppt/theme/theme2.xml><?xml version="1.0" encoding="utf-8"?>
+<a:theme xmlns:a="http://schemas.openxmlformats.org/drawingml/2006/main" name="Office 테마">
+  <a:themeElements>
+    <a:clrScheme name="Office">
+      <a:dk1>
+        <a:sysClr val="windowText" lastClr="000000"/>
+      </a:dk1>
+      <a:lt1>
+        <a:sysClr val="window" lastClr="FFFFFF"/>
+      </a:lt1>
+      <a:dk2>
+        <a:srgbClr val="44546A"/>
+      </a:dk2>
+      <a:lt2>
+        <a:srgbClr val="E7E6E6"/>
+      </a:lt2>
+      <a:accent1>
+        <a:srgbClr val="4472C4"/>
+      </a:accent1>
+      <a:accent2>
+        <a:srgbClr val="ED7D31"/>
+      </a:accent2>
+      <a:accent3>
+        <a:srgbClr val="A5A5A5"/>
+      </a:accent3>
+      <a:accent4>
+        <a:srgbClr val="FFC000"/>
+      </a:accent4>
+      <a:accent5>
+        <a:srgbClr val="5B9BD5"/>
+      </a:accent5>
+      <a:accent6>
+        <a:srgbClr val="70AD47"/>
+      </a:accent6>
+      <a:hlink>
+        <a:srgbClr val="0563C1"/>
+      </a:hlink>
+      <a:folHlink>
+        <a:srgbClr val="954F72"/>
+      </a:folHlink>
+    </a:clrScheme>
+    <a:fontScheme name="Office">
+      <a:majorFont>
+        <a:latin typeface="Calibri Light" panose="020F0302020204030204"/>
+        <a:ea typeface=""/>
+        <a:cs typeface=""/>
+        <a:font script="Jpan" typeface="游ゴシック Light"/>
+        <a:font script="Hang" typeface="맑은 고딕"/>
+        <a:font script="Hans" typeface="等线 Light"/>
+        <a:font script="Hant" typeface="新細明體"/>
+        <a:font script="Arab" typeface="Times New Roman"/>
+        <a:font script="Hebr" typeface="Times New Roman"/>
+        <a:font script="Thai" typeface="Angsana New"/>
+        <a:font script="Ethi" typeface="Nyala"/>
+        <a:font script="Beng" typeface="Vrinda"/>
+        <a:font script="Gujr" typeface="Shruti"/>
+        <a:font script="Khmr" typeface="MoolBoran"/>
+        <a:font script="Knda" typeface="Tunga"/>
+        <a:font script="Guru" typeface="Raavi"/>
+        <a:font script="Cans" typeface="Euphemia"/>
+        <a:font script="Cher" typeface="Plantagenet Cherokee"/>
+        <a:font script="Yiii" typeface="Microsoft Yi Baiti"/>
+        <a:font script="Tibt" typeface="Microsoft Himalaya"/>
+        <a:font script="Thaa" typeface="MV Boli"/>
+        <a:font script="Deva" typeface="Mangal"/>
+        <a:font script="Telu" typeface="Gautami"/>
+        <a:font script="Taml" typeface="Latha"/>
+        <a:font script="Syrc" typeface="Estrangelo Edessa"/>
+        <a:font script="Orya" typeface="Kalinga"/>
+        <a:font script="Mlym" typeface="Kartika"/>
+        <a:font script="Laoo" typeface="DokChampa"/>
+        <a:font script="Sinh" typeface="Iskoola Pota"/>
+        <a:font script="Mong" typeface="Mongolian Baiti"/>
+        <a:font script="Viet" typeface="Times New Roman"/>
+        <a:font script="Uigh" typeface="Microsoft Uighur"/>
+        <a:font script="Geor" typeface="Sylfaen"/>
+        <a:font script="Armn" typeface="Arial"/>
+        <a:font script="Bugi" typeface="Leelawadee UI"/>
+        <a:font script="Bopo" typeface="Microsoft JhengHei"/>
+        <a:font script="Java" typeface="Javanese Text"/>
+        <a:font script="Lisu" typeface="Segoe UI"/>
+        <a:font script="Mymr" typeface="Myanmar Text"/>
+        <a:font script="Nkoo" typeface="Ebrima"/>
+        <a:font script="Olck" typeface="Nirmala UI"/>
+        <a:font script="Osma" typeface="Ebrima"/>
+        <a:font script="Phag" typeface="Phagspa"/>
+        <a:font script="Syrn" typeface="Estrangelo Edessa"/>
+        <a:font script="Syrj" typeface="Estrangelo Edessa"/>
+        <a:font script="Syre" typeface="Estrangelo Edessa"/>
+        <a:font script="Sora" typeface="Nirmala UI"/>
+        <a:font script="Tale" typeface="Microsoft Tai Le"/>
+        <a:font script="Talu" typeface="Microsoft New Tai Lue"/>
+        <a:font script="Tfng" typeface="Ebrima"/>
+      </a:majorFont>
+      <a:minorFont>
+        <a:latin typeface="Calibri" panose="020F0502020204030204"/>
+        <a:ea typeface=""/>
+        <a:cs typeface=""/>
+        <a:font script="Jpan" typeface="游ゴシック"/>
+        <a:font script="Hang" typeface="맑은 고딕"/>
+        <a:font script="Hans" typeface="等线"/>
+        <a:font script="Hant" typeface="新細明體"/>
+        <a:font script="Arab" typeface="Arial"/>
+        <a:font script="Hebr" typeface="Arial"/>
+        <a:font script="Thai" typeface="Cordia New"/>
+        <a:font script="Ethi" typeface="Nyala"/>
+        <a:font script="Beng" typeface="Vrinda"/>
+        <a:font script="Gujr" typeface="Shruti"/>
+        <a:font script="Khmr" typeface="DaunPenh"/>
+        <a:font script="Knda" typeface="Tunga"/>
+        <a:font script="Guru" typeface="Raavi"/>
+        <a:font script="Cans" typeface="Euphemia"/>
+        <a:font script="Cher" typeface="Plantagenet Cherokee"/>
+        <a:font script="Yiii" typeface="Microsoft Yi Baiti"/>
+        <a:font script="Tibt" typeface="Microsoft Himalaya"/>
+        <a:font script="Thaa" typeface="MV Boli"/>
+        <a:font script="Deva" typeface="Mangal"/>
+        <a:font script="Telu" typeface="Gautami"/>
+        <a:font script="Taml" typeface="Latha"/>
+        <a:font script="Syrc" typeface="Estrangelo Edessa"/>
+        <a:font script="Orya" typeface="Kalinga"/>
+        <a:font script="Mlym" typeface="Kartika"/>
+        <a:font script="Laoo" typeface="DokChampa"/>
+        <a:font script="Sinh" typeface="Iskoola Pota"/>
+        <a:font script="Mong" typeface="Mongolian Baiti"/>
+        <a:font script="Viet" typeface="Arial"/>
+        <a:font script="Uigh" typeface="Microsoft Uighur"/>
+        <a:font script="Geor" typeface="Sylfaen"/>
+        <a:font script="Armn" typeface="Arial"/>
+        <a:font script="Bugi" typeface="Leelawadee UI"/>
+        <a:font script="Bopo" typeface="Microsoft JhengHei"/>
+        <a:font script="Java" typeface="Javanese Text"/>
+        <a:font script="Lisu" typeface="Segoe UI"/>
+        <a:font script="Mymr" typeface="Myanmar Text"/>
+        <a:font script="Nkoo" typeface="Ebrima"/>
+        <a:font script="Olck" typeface="Nirmala UI"/>
+        <a:font script="Osma" typeface="Ebrima"/>
+        <a:font script="Phag" typeface="Phagspa"/>
+        <a:font script="Syrn" typeface="Estrangelo Edessa"/>
+        <a:font script="Syrj" typeface="Estrangelo Edessa"/>
+        <a:font script="Syre" typeface="Estrangelo Edessa"/>
+        <a:font script="Sora" typeface="Nirmala UI"/>
+        <a:font script="Tale" typeface="Microsoft Tai Le"/>
+        <a:font script="Talu" typeface="Microsoft New Tai Lue"/>
+        <a:font script="Tfng" typeface="Ebrima"/>
+      </a:minorFont>
+    </a:fontScheme>
+    <a:fmtScheme name="Office">
+      <a:fillStyleLst>
+        <a:solidFill>
+          <a:schemeClr val="phClr"/>
+        </a:solidFill>
+        <a:gradFill rotWithShape="1">
+          <a:gsLst>
+            <a:gs pos="0">
+              <a:schemeClr val="phClr">
+                <a:lumMod val="110000"/>
+                <a:satMod val="105000"/>
+                <a:tint val="67000"/>
+              </a:schemeClr>
+            </a:gs>
+            <a:gs pos="50000">
+              <a:schemeClr val="phClr">
+                <a:lumMod val="105000"/>
+                <a:satMod val="103000"/>
+                <a:tint val="73000"/>
+              </a:schemeClr>
+            </a:gs>
+            <a:gs pos="100000">
+              <a:schemeClr val="phClr">
+                <a:lumMod val="105000"/>
+                <a:satMod val="109000"/>
+                <a:tint val="81000"/>
+              </a:schemeClr>
+            </a:gs>
+          </a:gsLst>
+          <a:lin ang="5400000" scaled="0"/>
+        </a:gradFill>
+        <a:gradFill rotWithShape="1">
+          <a:gsLst>
+            <a:gs pos="0">
+              <a:schemeClr val="phClr">
+                <a:satMod val="103000"/>
+                <a:lumMod val="102000"/>
+                <a:tint val="94000"/>
+              </a:schemeClr>
+            </a:gs>
+            <a:gs pos="50000">
+              <a:schemeClr val="phClr">
+                <a:satMod val="110000"/>
+                <a:lumMod val="100000"/>
+                <a:shade val="100000"/>
+              </a:schemeClr>
+            </a:gs>
+            <a:gs pos="100000">
+              <a:schemeClr val="phClr">
+                <a:lumMod val="99000"/>
+                <a:satMod val="120000"/>
+                <a:shade val="78000"/>
+              </a:schemeClr>
+            </a:gs>
+          </a:gsLst>
+          <a:lin ang="5400000" scaled="0"/>
+        </a:gradFill>
+      </a:fillStyleLst>
+      <a:lnStyleLst>
+        <a:ln w="6350" cap="flat" cmpd="sng" algn="ctr">
+          <a:solidFill>
+            <a:schemeClr val="phClr"/>
+          </a:solidFill>
+          <a:prstDash val="solid"/>
+          <a:miter lim="800000"/>
+        </a:ln>
+        <a:ln w="12700" cap="flat" cmpd="sng" algn="ctr">
+          <a:solidFill>
+            <a:schemeClr val="phClr"/>
+          </a:solidFill>
+          <a:prstDash val="solid"/>
+          <a:miter lim="800000"/>
+        </a:ln>
+        <a:ln w="19050" cap="flat" cmpd="sng" algn="ctr">
+          <a:solidFill>
+            <a:schemeClr val="phClr"/>
+          </a:solidFill>
+          <a:prstDash val="solid"/>
+          <a:miter lim="800000"/>
+        </a:ln>
+      </a:lnStyleLst>
+      <a:effectStyleLst>
+        <a:effectStyle>
+          <a:effectLst/>
+        </a:effectStyle>
+        <a:effectStyle>
+          <a:effectLst/>
+        </a:effectStyle>
+        <a:effectStyle>
+          <a:effectLst>
+            <a:outerShdw blurRad="57150" dist="19050" dir="5400000" algn="ctr" rotWithShape="0">
+              <a:srgbClr val="000000">
+                <a:alpha val="63000"/>
+              </a:srgbClr>
+            </a:outerShdw>
+          </a:effectLst>
+        </a:effectStyle>
+      </a:effectStyleLst>
+      <a:bgFillStyleLst>
+        <a:solidFill>
+          <a:schemeClr val="phClr"/>
+        </a:solidFill>
+        <a:solidFill>
+          <a:schemeClr val="phClr">
+            <a:tint val="95000"/>
+            <a:satMod val="170000"/>
+          </a:schemeClr>
+        </a:solidFill>
+        <a:gradFill rotWithShape="1">
+          <a:gsLst>
+            <a:gs pos="0">
+              <a:schemeClr val="phClr">
+                <a:tint val="93000"/>
+                <a:satMod val="150000"/>
+                <a:shade val="98000"/>
+                <a:lumMod val="102000"/>
+              </a:schemeClr>
+            </a:gs>
+            <a:gs pos="50000">
+              <a:schemeClr val="phClr">
+                <a:tint val="98000"/>
+                <a:satMod val="130000"/>
+                <a:shade val="90000"/>
+                <a:lumMod val="103000"/>
+              </a:schemeClr>
+            </a:gs>
+            <a:gs pos="100000">
+              <a:schemeClr val="phClr">
+                <a:shade val="63000"/>
+                <a:satMod val="120000"/>
+              </a:schemeClr>
+            </a:gs>
+          </a:gsLst>
+          <a:lin ang="5400000" scaled="0"/>
+        </a:gradFill>
+      </a:bgFillStyleLst>
+    </a:fmtScheme>
+  </a:themeElements>
+  <a:objectDefaults/>
+  <a:extraClrSchemeLst/>
+  <a:extLst>
+    <a:ext uri="{05A4C25C-085E-4340-85A3-A5531E510DB2}">
+      <thm15:themeFamily xmlns:thm15="http://schemas.microsoft.com/office/thememl/2012/main" name="Office Theme" id="{62F939B6-93AF-4DB8-9C6B-D6C7DFDC589F}" vid="{4A3C46E8-61CC-4603-A589-7422A47A8E4A}"/>
+    </a:ext>
+  </a:extLst>
+</a:theme>
 </file>
</xml_diff>